<commit_message>
updates to lecture 1
</commit_message>
<xml_diff>
--- a/Part 1/Lecture 1.pptx
+++ b/Part 1/Lecture 1.pptx
@@ -495,7 +495,7 @@
           <a:p>
             <a:fld id="{A74DA294-1B42-874D-8153-BC1D11BBC479}" type="datetimeFigureOut">
               <a:rPr lang="en-US" smtClean="0"/>
-              <a:t>7/29/25</a:t>
+              <a:t>7/30/25</a:t>
             </a:fld>
             <a:endParaRPr lang="en-US"/>
           </a:p>
@@ -806,84 +806,6 @@
           <a:bodyPr/>
           <a:lstStyle/>
           <a:p>
-            <a:pPr marL="0" marR="0" lvl="0" indent="0" algn="l" defTabSz="914400" rtl="0" eaLnBrk="1" fontAlgn="auto" latinLnBrk="0" hangingPunct="1">
-              <a:lnSpc>
-                <a:spcPct val="100000"/>
-              </a:lnSpc>
-              <a:spcBef>
-                <a:spcPts val="0"/>
-              </a:spcBef>
-              <a:spcAft>
-                <a:spcPts val="0"/>
-              </a:spcAft>
-              <a:buClrTx/>
-              <a:buSzTx/>
-              <a:buFontTx/>
-              <a:buNone/>
-              <a:tabLst/>
-              <a:defRPr/>
-            </a:pPr>
-            <a:r>
-              <a:rPr lang="en-US" sz="1200" dirty="0">
-                <a:solidFill>
-                  <a:srgbClr val="000000"/>
-                </a:solidFill>
-                <a:effectLst/>
-                <a:latin typeface="+mj-lt"/>
-                <a:ea typeface="Times New Roman" panose="02020603050405020304" pitchFamily="18" charset="0"/>
-              </a:rPr>
-              <a:t>Cholera burden estimation largely relies on passive clinical based surveillance which </a:t>
-            </a:r>
-            <a:r>
-              <a:rPr lang="en-US" sz="1200" dirty="0">
-                <a:solidFill>
-                  <a:srgbClr val="000000"/>
-                </a:solidFill>
-                <a:latin typeface="+mj-lt"/>
-                <a:ea typeface="Times New Roman" panose="02020603050405020304" pitchFamily="18" charset="0"/>
-              </a:rPr>
-              <a:t>only </a:t>
-            </a:r>
-            <a:r>
-              <a:rPr lang="en-US" sz="1200" dirty="0">
-                <a:solidFill>
-                  <a:srgbClr val="000000"/>
-                </a:solidFill>
-                <a:effectLst/>
-                <a:latin typeface="+mj-lt"/>
-                <a:ea typeface="Times New Roman" panose="02020603050405020304" pitchFamily="18" charset="0"/>
-              </a:rPr>
-              <a:t>captures a fraction of true infections due to variable clinical presentations and access to healthcare</a:t>
-            </a:r>
-          </a:p>
-          <a:p>
-            <a:endParaRPr lang="en-US" dirty="0"/>
-          </a:p>
-          <a:p>
-            <a:r>
-              <a:rPr lang="en-US" dirty="0"/>
-              <a:t>This is the paradigm or cascade of how we capture true burden</a:t>
-            </a:r>
-          </a:p>
-          <a:p>
-            <a:endParaRPr lang="en-US" dirty="0"/>
-          </a:p>
-          <a:p>
-            <a:r>
-              <a:rPr lang="en-US" dirty="0"/>
-              <a:t>Add icon to indicate serology, healthcare seeking, clinical burden</a:t>
-            </a:r>
-          </a:p>
-          <a:p>
-            <a:endParaRPr lang="en-US" dirty="0"/>
-          </a:p>
-          <a:p>
-            <a:r>
-              <a:rPr lang="en-US" dirty="0"/>
-              <a:t>(or consider iceberg figure)</a:t>
-            </a:r>
-          </a:p>
-          <a:p>
             <a:endParaRPr lang="en-US" dirty="0"/>
           </a:p>
         </p:txBody>
@@ -1003,10 +925,7 @@
               <a:tabLst/>
               <a:defRPr/>
             </a:pPr>
-            <a:r>
-              <a:rPr lang="en-US" dirty="0"/>
-              <a:t>New technologies allow multiplexing to test one single specimen for dozens of antibodies simultaneously, maximizing the efficiency. By testing everything at once, this minimizes the use of reagents and laboratory staff time. It also makes it possible to include additional antigens that might not otherwise have been included if they are obscure.</a:t>
-            </a:r>
+            <a:endParaRPr lang="en-US" dirty="0"/>
           </a:p>
         </p:txBody>
       </p:sp>
@@ -1131,10 +1050,7 @@
               <a:tabLst/>
               <a:defRPr/>
             </a:pPr>
-            <a:r>
-              <a:rPr lang="en-US" dirty="0"/>
-              <a:t>New technologies allow multiplexing to test one single specimen for dozens of antibodies simultaneously, maximizing the efficiency. By testing everything at once, this minimizes the use of reagents and laboratory staff time. It also makes it possible to include additional antigens that might not otherwise have been included if they are obscure.</a:t>
-            </a:r>
+            <a:endParaRPr lang="en-US" dirty="0"/>
           </a:p>
         </p:txBody>
       </p:sp>
@@ -1326,84 +1242,6 @@
           <a:bodyPr/>
           <a:lstStyle/>
           <a:p>
-            <a:pPr marL="0" marR="0" lvl="0" indent="0" algn="l" defTabSz="914400" rtl="0" eaLnBrk="1" fontAlgn="auto" latinLnBrk="0" hangingPunct="1">
-              <a:lnSpc>
-                <a:spcPct val="100000"/>
-              </a:lnSpc>
-              <a:spcBef>
-                <a:spcPts val="0"/>
-              </a:spcBef>
-              <a:spcAft>
-                <a:spcPts val="0"/>
-              </a:spcAft>
-              <a:buClrTx/>
-              <a:buSzTx/>
-              <a:buFontTx/>
-              <a:buNone/>
-              <a:tabLst/>
-              <a:defRPr/>
-            </a:pPr>
-            <a:r>
-              <a:rPr lang="en-US" sz="1200" dirty="0">
-                <a:solidFill>
-                  <a:srgbClr val="000000"/>
-                </a:solidFill>
-                <a:effectLst/>
-                <a:latin typeface="+mj-lt"/>
-                <a:ea typeface="Times New Roman" panose="02020603050405020304" pitchFamily="18" charset="0"/>
-              </a:rPr>
-              <a:t>Cholera burden estimation largely relies on passive clinical based surveillance which </a:t>
-            </a:r>
-            <a:r>
-              <a:rPr lang="en-US" sz="1200" dirty="0">
-                <a:solidFill>
-                  <a:srgbClr val="000000"/>
-                </a:solidFill>
-                <a:latin typeface="+mj-lt"/>
-                <a:ea typeface="Times New Roman" panose="02020603050405020304" pitchFamily="18" charset="0"/>
-              </a:rPr>
-              <a:t>only </a:t>
-            </a:r>
-            <a:r>
-              <a:rPr lang="en-US" sz="1200" dirty="0">
-                <a:solidFill>
-                  <a:srgbClr val="000000"/>
-                </a:solidFill>
-                <a:effectLst/>
-                <a:latin typeface="+mj-lt"/>
-                <a:ea typeface="Times New Roman" panose="02020603050405020304" pitchFamily="18" charset="0"/>
-              </a:rPr>
-              <a:t>captures a fraction of true infections due to variable clinical presentations and access to healthcare</a:t>
-            </a:r>
-          </a:p>
-          <a:p>
-            <a:endParaRPr lang="en-US" dirty="0"/>
-          </a:p>
-          <a:p>
-            <a:r>
-              <a:rPr lang="en-US" dirty="0"/>
-              <a:t>This is the paradigm or cascade of how we capture true burden</a:t>
-            </a:r>
-          </a:p>
-          <a:p>
-            <a:endParaRPr lang="en-US" dirty="0"/>
-          </a:p>
-          <a:p>
-            <a:r>
-              <a:rPr lang="en-US" dirty="0"/>
-              <a:t>Add icon to indicate serology, healthcare seeking, clinical burden</a:t>
-            </a:r>
-          </a:p>
-          <a:p>
-            <a:endParaRPr lang="en-US" dirty="0"/>
-          </a:p>
-          <a:p>
-            <a:r>
-              <a:rPr lang="en-US" dirty="0"/>
-              <a:t>(or consider iceberg figure)</a:t>
-            </a:r>
-          </a:p>
-          <a:p>
             <a:endParaRPr lang="en-US" dirty="0"/>
           </a:p>
         </p:txBody>
@@ -1512,84 +1350,6 @@
           <a:bodyPr/>
           <a:lstStyle/>
           <a:p>
-            <a:pPr marL="0" marR="0" lvl="0" indent="0" algn="l" defTabSz="914400" rtl="0" eaLnBrk="1" fontAlgn="auto" latinLnBrk="0" hangingPunct="1">
-              <a:lnSpc>
-                <a:spcPct val="100000"/>
-              </a:lnSpc>
-              <a:spcBef>
-                <a:spcPts val="0"/>
-              </a:spcBef>
-              <a:spcAft>
-                <a:spcPts val="0"/>
-              </a:spcAft>
-              <a:buClrTx/>
-              <a:buSzTx/>
-              <a:buFontTx/>
-              <a:buNone/>
-              <a:tabLst/>
-              <a:defRPr/>
-            </a:pPr>
-            <a:r>
-              <a:rPr lang="en-US" sz="1200" dirty="0">
-                <a:solidFill>
-                  <a:srgbClr val="000000"/>
-                </a:solidFill>
-                <a:effectLst/>
-                <a:latin typeface="+mj-lt"/>
-                <a:ea typeface="Times New Roman" panose="02020603050405020304" pitchFamily="18" charset="0"/>
-              </a:rPr>
-              <a:t>Cholera burden estimation largely relies on passive clinical based surveillance which </a:t>
-            </a:r>
-            <a:r>
-              <a:rPr lang="en-US" sz="1200" dirty="0">
-                <a:solidFill>
-                  <a:srgbClr val="000000"/>
-                </a:solidFill>
-                <a:latin typeface="+mj-lt"/>
-                <a:ea typeface="Times New Roman" panose="02020603050405020304" pitchFamily="18" charset="0"/>
-              </a:rPr>
-              <a:t>only </a:t>
-            </a:r>
-            <a:r>
-              <a:rPr lang="en-US" sz="1200" dirty="0">
-                <a:solidFill>
-                  <a:srgbClr val="000000"/>
-                </a:solidFill>
-                <a:effectLst/>
-                <a:latin typeface="+mj-lt"/>
-                <a:ea typeface="Times New Roman" panose="02020603050405020304" pitchFamily="18" charset="0"/>
-              </a:rPr>
-              <a:t>captures a fraction of true infections due to variable clinical presentations and access to healthcare</a:t>
-            </a:r>
-          </a:p>
-          <a:p>
-            <a:endParaRPr lang="en-US" dirty="0"/>
-          </a:p>
-          <a:p>
-            <a:r>
-              <a:rPr lang="en-US" dirty="0"/>
-              <a:t>This is the paradigm or cascade of how we capture true burden</a:t>
-            </a:r>
-          </a:p>
-          <a:p>
-            <a:endParaRPr lang="en-US" dirty="0"/>
-          </a:p>
-          <a:p>
-            <a:r>
-              <a:rPr lang="en-US" dirty="0"/>
-              <a:t>Add icon to indicate serology, healthcare seeking, clinical burden</a:t>
-            </a:r>
-          </a:p>
-          <a:p>
-            <a:endParaRPr lang="en-US" dirty="0"/>
-          </a:p>
-          <a:p>
-            <a:r>
-              <a:rPr lang="en-US" dirty="0"/>
-              <a:t>(or consider iceberg figure)</a:t>
-            </a:r>
-          </a:p>
-          <a:p>
             <a:endParaRPr lang="en-US" dirty="0"/>
           </a:p>
         </p:txBody>
@@ -1697,84 +1457,6 @@
         <p:txBody>
           <a:bodyPr/>
           <a:lstStyle/>
-          <a:p>
-            <a:pPr marL="0" marR="0" lvl="0" indent="0" algn="l" defTabSz="914400" rtl="0" eaLnBrk="1" fontAlgn="auto" latinLnBrk="0" hangingPunct="1">
-              <a:lnSpc>
-                <a:spcPct val="100000"/>
-              </a:lnSpc>
-              <a:spcBef>
-                <a:spcPts val="0"/>
-              </a:spcBef>
-              <a:spcAft>
-                <a:spcPts val="0"/>
-              </a:spcAft>
-              <a:buClrTx/>
-              <a:buSzTx/>
-              <a:buFontTx/>
-              <a:buNone/>
-              <a:tabLst/>
-              <a:defRPr/>
-            </a:pPr>
-            <a:r>
-              <a:rPr lang="en-US" sz="1200" dirty="0">
-                <a:solidFill>
-                  <a:srgbClr val="000000"/>
-                </a:solidFill>
-                <a:effectLst/>
-                <a:latin typeface="+mj-lt"/>
-                <a:ea typeface="Times New Roman" panose="02020603050405020304" pitchFamily="18" charset="0"/>
-              </a:rPr>
-              <a:t>Cholera burden estimation largely relies on passive clinical based surveillance which </a:t>
-            </a:r>
-            <a:r>
-              <a:rPr lang="en-US" sz="1200" dirty="0">
-                <a:solidFill>
-                  <a:srgbClr val="000000"/>
-                </a:solidFill>
-                <a:latin typeface="+mj-lt"/>
-                <a:ea typeface="Times New Roman" panose="02020603050405020304" pitchFamily="18" charset="0"/>
-              </a:rPr>
-              <a:t>only </a:t>
-            </a:r>
-            <a:r>
-              <a:rPr lang="en-US" sz="1200" dirty="0">
-                <a:solidFill>
-                  <a:srgbClr val="000000"/>
-                </a:solidFill>
-                <a:effectLst/>
-                <a:latin typeface="+mj-lt"/>
-                <a:ea typeface="Times New Roman" panose="02020603050405020304" pitchFamily="18" charset="0"/>
-              </a:rPr>
-              <a:t>captures a fraction of true infections due to variable clinical presentations and access to healthcare</a:t>
-            </a:r>
-          </a:p>
-          <a:p>
-            <a:endParaRPr lang="en-US" dirty="0"/>
-          </a:p>
-          <a:p>
-            <a:r>
-              <a:rPr lang="en-US" dirty="0"/>
-              <a:t>This is the paradigm or cascade of how we capture true burden</a:t>
-            </a:r>
-          </a:p>
-          <a:p>
-            <a:endParaRPr lang="en-US" dirty="0"/>
-          </a:p>
-          <a:p>
-            <a:r>
-              <a:rPr lang="en-US" dirty="0"/>
-              <a:t>Add icon to indicate serology, healthcare seeking, clinical burden</a:t>
-            </a:r>
-          </a:p>
-          <a:p>
-            <a:endParaRPr lang="en-US" dirty="0"/>
-          </a:p>
-          <a:p>
-            <a:r>
-              <a:rPr lang="en-US" dirty="0"/>
-              <a:t>(or consider iceberg figure)</a:t>
-            </a:r>
-          </a:p>
           <a:p>
             <a:endParaRPr lang="en-US" dirty="0"/>
           </a:p>
@@ -1967,10 +1649,7 @@
               <a:tabLst/>
               <a:defRPr/>
             </a:pPr>
-            <a:r>
-              <a:rPr lang="en-US" dirty="0"/>
-              <a:t>Example on the right is tracking SARS-CoV-2 seroprevalence during the first year of the pandemic in Mexico</a:t>
-            </a:r>
+            <a:endParaRPr lang="en-US" dirty="0"/>
           </a:p>
         </p:txBody>
       </p:sp>
@@ -2072,10 +1751,7 @@
           <a:bodyPr/>
           <a:lstStyle/>
           <a:p>
-            <a:r>
-              <a:rPr lang="en-US" dirty="0"/>
-              <a:t>Example on the right is from India Measles and rubella seroprevalence before and after vaccination campaigns</a:t>
-            </a:r>
+            <a:endParaRPr lang="en-US" dirty="0"/>
           </a:p>
         </p:txBody>
       </p:sp>
@@ -2183,10 +1859,7 @@
           <a:bodyPr/>
           <a:lstStyle/>
           <a:p>
-            <a:r>
-              <a:rPr lang="en-US" dirty="0"/>
-              <a:t>Righthand example is the Impact of bed net distribution on malaria seroprevalence in Mozambique. Blue is before and red is afterward. </a:t>
-            </a:r>
+            <a:endParaRPr lang="en-US" dirty="0"/>
           </a:p>
         </p:txBody>
       </p:sp>
@@ -2311,10 +1984,7 @@
               <a:tabLst/>
               <a:defRPr/>
             </a:pPr>
-            <a:r>
-              <a:rPr lang="en-US" dirty="0"/>
-              <a:t>On the right is an example monitoring onchocerciasis elimination in Uganda</a:t>
-            </a:r>
+            <a:endParaRPr lang="en-US" dirty="0"/>
           </a:p>
         </p:txBody>
       </p:sp>
@@ -4630,7 +4300,7 @@
                   <a:schemeClr val="accent5"/>
                 </a:solidFill>
               </a:rPr>
-              <a:t>(Lecture 4)</a:t>
+              <a:t>(Part 5)</a:t>
             </a:r>
           </a:p>
           <a:p>
@@ -4792,7 +4462,7 @@
                   <a:schemeClr val="accent5"/>
                 </a:solidFill>
               </a:rPr>
-              <a:t>(Lecture 5)</a:t>
+              <a:t>(Part 6)</a:t>
             </a:r>
           </a:p>
           <a:p>
@@ -7641,7 +7311,24 @@
                 <a:ea typeface="Arial" panose="020B0604020202020204" pitchFamily="34" charset="0"/>
                 <a:cs typeface="Calibri"/>
               </a:rPr>
-              <a:t>Measles and Rubella in </a:t>
+              <a:t>Measles and </a:t>
+            </a:r>
+            <a:r>
+              <a:rPr lang="en-US" sz="1800" b="1" dirty="0">
+                <a:latin typeface="Helvetica" pitchFamily="2" charset="0"/>
+                <a:ea typeface="Arial" panose="020B0604020202020204" pitchFamily="34" charset="0"/>
+                <a:cs typeface="Calibri"/>
+              </a:rPr>
+              <a:t>r</a:t>
+            </a:r>
+            <a:r>
+              <a:rPr lang="en-US" sz="1800" b="1" dirty="0">
+                <a:effectLst/>
+                <a:latin typeface="Helvetica" pitchFamily="2" charset="0"/>
+                <a:ea typeface="Arial" panose="020B0604020202020204" pitchFamily="34" charset="0"/>
+                <a:cs typeface="Calibri"/>
+              </a:rPr>
+              <a:t>ubella in </a:t>
             </a:r>
             <a:r>
               <a:rPr lang="en-US" sz="1800" b="1" dirty="0">
@@ -20397,7 +20084,7 @@
         <p:spPr>
           <a:xfrm>
             <a:off x="6930171" y="5675394"/>
-            <a:ext cx="5767753" cy="461665"/>
+            <a:ext cx="5050019" cy="461665"/>
           </a:xfrm>
           <a:prstGeom prst="rect">
             <a:avLst/>
@@ -20421,7 +20108,7 @@
                   <a:schemeClr val="accent5"/>
                 </a:solidFill>
               </a:rPr>
-              <a:t>Lecture 2</a:t>
+              <a:t>Part 3</a:t>
             </a:r>
           </a:p>
         </p:txBody>
@@ -22856,15 +22543,7 @@
           <a:p>
             <a:r>
               <a:rPr lang="en-US" sz="2200" dirty="0"/>
-              <a:t>Part 1: Introduction to the </a:t>
-            </a:r>
-            <a:r>
-              <a:rPr lang="en-US" sz="2200" dirty="0" err="1"/>
-              <a:t>Seroanalytics</a:t>
-            </a:r>
-            <a:r>
-              <a:rPr lang="en-US" sz="2200" dirty="0"/>
-              <a:t> Workshop</a:t>
+              <a:t>Part 1: Introduction to the Seroanalytics Workshop</a:t>
             </a:r>
           </a:p>
           <a:p>
@@ -22891,7 +22570,7 @@
           <a:p>
             <a:r>
               <a:rPr lang="en-US" sz="2200" dirty="0"/>
-              <a:t>Part 4: Visualizations for serological data</a:t>
+              <a:t>Part 4: Visualizing and standardizing serological data</a:t>
             </a:r>
           </a:p>
           <a:p>
@@ -22909,7 +22588,7 @@
           <a:p>
             <a:r>
               <a:rPr lang="en-US" sz="2200" dirty="0"/>
-              <a:t>Part 6: From serological data to transmission dynamics</a:t>
+              <a:t>Part 6:  Inferring transmission dynamics from seroprevalence data</a:t>
             </a:r>
           </a:p>
           <a:p>
@@ -22918,13 +22597,25 @@
           <a:p>
             <a:r>
               <a:rPr lang="en-US" sz="2200" dirty="0"/>
-              <a:t>+ Time to work on individual projects</a:t>
+              <a:t>+ Time to work on </a:t>
+            </a:r>
+            <a:r>
+              <a:rPr lang="en-US" sz="2200" b="1" dirty="0"/>
+              <a:t>individual projects</a:t>
             </a:r>
           </a:p>
           <a:p>
             <a:r>
               <a:rPr lang="en-US" sz="2200" dirty="0"/>
-              <a:t>+ Seminars on advanced topics</a:t>
+              <a:t>+ </a:t>
+            </a:r>
+            <a:r>
+              <a:rPr lang="en-US" sz="2200" b="1" dirty="0"/>
+              <a:t>Extra lectures</a:t>
+            </a:r>
+            <a:r>
+              <a:rPr lang="en-US" sz="2200" dirty="0"/>
+              <a:t> on advanced topics</a:t>
             </a:r>
           </a:p>
         </p:txBody>
@@ -23052,7 +22743,7 @@
           <a:p>
             <a:r>
               <a:rPr lang="en-US" sz="2200" dirty="0"/>
-              <a:t>Part 4: Visualizations for serological data</a:t>
+              <a:t>Part 4: Visualizing and standardizing serological data</a:t>
             </a:r>
           </a:p>
           <a:p>
@@ -23070,7 +22761,7 @@
           <a:p>
             <a:r>
               <a:rPr lang="en-US" sz="2200" dirty="0"/>
-              <a:t>Part 6: From serological data to transmission dynamics</a:t>
+              <a:t>Part 6:  Inferring transmission dynamics from seroprevalence data</a:t>
             </a:r>
           </a:p>
           <a:p>
@@ -23093,7 +22784,7 @@
             </a:r>
             <a:r>
               <a:rPr lang="en-US" sz="2200" b="1" dirty="0"/>
-              <a:t>Seminars</a:t>
+              <a:t>Extra lectures</a:t>
             </a:r>
             <a:r>
               <a:rPr lang="en-US" sz="2200" dirty="0"/>

</xml_diff>